<commit_message>
Adding more to the epics introduction
</commit_message>
<xml_diff>
--- a/presentations/00 Setting Up.pptx
+++ b/presentations/00 Setting Up.pptx
@@ -5,12 +5,13 @@
     <p:sldMasterId id="2147483648" r:id="rId1"/>
   </p:sldMasterIdLst>
   <p:notesMasterIdLst>
-    <p:notesMasterId r:id="rId5"/>
+    <p:notesMasterId r:id="rId6"/>
   </p:notesMasterIdLst>
   <p:sldIdLst>
     <p:sldId id="256" r:id="rId2"/>
     <p:sldId id="278" r:id="rId3"/>
     <p:sldId id="279" r:id="rId4"/>
+    <p:sldId id="280" r:id="rId5"/>
   </p:sldIdLst>
   <p:sldSz cx="12192000" cy="6858000"/>
   <p:notesSz cx="6858000" cy="9144000"/>
@@ -111,7 +112,7 @@
   </p:defaultTextStyle>
   <p:extLst>
     <p:ext uri="{EFAFB233-063F-42B5-8137-9DF3F51BA10A}">
-      <p15:sldGuideLst xmlns:p15="http://schemas.microsoft.com/office/powerpoint/2012/main"/>
+      <p15:sldGuideLst xmlns:p15="http://schemas.microsoft.com/office/powerpoint/2012/main" xmlns=""/>
     </p:ext>
   </p:extLst>
 </p:presentation>
@@ -199,7 +200,7 @@
           <a:p>
             <a:fld id="{B84E6EC5-5961-44EB-A38E-C5B9CD2A3363}" type="datetimeFigureOut">
               <a:rPr lang="en-US" smtClean="0"/>
-              <a:t>5/6/2016</a:t>
+              <a:t>5/16/16</a:t>
             </a:fld>
             <a:endParaRPr lang="en-US"/>
           </a:p>
@@ -598,7 +599,7 @@
           <a:p>
             <a:fld id="{D1C2D9A5-2501-4A0C-90A8-57153B34B748}" type="datetimeFigureOut">
               <a:rPr lang="en-US" smtClean="0"/>
-              <a:t>5/6/2016</a:t>
+              <a:t>5/16/16</a:t>
             </a:fld>
             <a:endParaRPr lang="en-US"/>
           </a:p>
@@ -768,7 +769,7 @@
           <a:p>
             <a:fld id="{D1C2D9A5-2501-4A0C-90A8-57153B34B748}" type="datetimeFigureOut">
               <a:rPr lang="en-US" smtClean="0"/>
-              <a:t>5/6/2016</a:t>
+              <a:t>5/16/16</a:t>
             </a:fld>
             <a:endParaRPr lang="en-US"/>
           </a:p>
@@ -948,7 +949,7 @@
           <a:p>
             <a:fld id="{D1C2D9A5-2501-4A0C-90A8-57153B34B748}" type="datetimeFigureOut">
               <a:rPr lang="en-US" smtClean="0"/>
-              <a:t>5/6/2016</a:t>
+              <a:t>5/16/16</a:t>
             </a:fld>
             <a:endParaRPr lang="en-US"/>
           </a:p>
@@ -1118,7 +1119,7 @@
           <a:p>
             <a:fld id="{D1C2D9A5-2501-4A0C-90A8-57153B34B748}" type="datetimeFigureOut">
               <a:rPr lang="en-US" smtClean="0"/>
-              <a:t>5/6/2016</a:t>
+              <a:t>5/16/16</a:t>
             </a:fld>
             <a:endParaRPr lang="en-US"/>
           </a:p>
@@ -1364,7 +1365,7 @@
           <a:p>
             <a:fld id="{D1C2D9A5-2501-4A0C-90A8-57153B34B748}" type="datetimeFigureOut">
               <a:rPr lang="en-US" smtClean="0"/>
-              <a:t>5/6/2016</a:t>
+              <a:t>5/16/16</a:t>
             </a:fld>
             <a:endParaRPr lang="en-US"/>
           </a:p>
@@ -1596,7 +1597,7 @@
           <a:p>
             <a:fld id="{D1C2D9A5-2501-4A0C-90A8-57153B34B748}" type="datetimeFigureOut">
               <a:rPr lang="en-US" smtClean="0"/>
-              <a:t>5/6/2016</a:t>
+              <a:t>5/16/16</a:t>
             </a:fld>
             <a:endParaRPr lang="en-US"/>
           </a:p>
@@ -1963,7 +1964,7 @@
           <a:p>
             <a:fld id="{D1C2D9A5-2501-4A0C-90A8-57153B34B748}" type="datetimeFigureOut">
               <a:rPr lang="en-US" smtClean="0"/>
-              <a:t>5/6/2016</a:t>
+              <a:t>5/16/16</a:t>
             </a:fld>
             <a:endParaRPr lang="en-US"/>
           </a:p>
@@ -2081,7 +2082,7 @@
           <a:p>
             <a:fld id="{D1C2D9A5-2501-4A0C-90A8-57153B34B748}" type="datetimeFigureOut">
               <a:rPr lang="en-US" smtClean="0"/>
-              <a:t>5/6/2016</a:t>
+              <a:t>5/16/16</a:t>
             </a:fld>
             <a:endParaRPr lang="en-US"/>
           </a:p>
@@ -2176,7 +2177,7 @@
           <a:p>
             <a:fld id="{D1C2D9A5-2501-4A0C-90A8-57153B34B748}" type="datetimeFigureOut">
               <a:rPr lang="en-US" smtClean="0"/>
-              <a:t>5/6/2016</a:t>
+              <a:t>5/16/16</a:t>
             </a:fld>
             <a:endParaRPr lang="en-US"/>
           </a:p>
@@ -2453,7 +2454,7 @@
           <a:p>
             <a:fld id="{D1C2D9A5-2501-4A0C-90A8-57153B34B748}" type="datetimeFigureOut">
               <a:rPr lang="en-US" smtClean="0"/>
-              <a:t>5/6/2016</a:t>
+              <a:t>5/16/16</a:t>
             </a:fld>
             <a:endParaRPr lang="en-US"/>
           </a:p>
@@ -2706,7 +2707,7 @@
           <a:p>
             <a:fld id="{D1C2D9A5-2501-4A0C-90A8-57153B34B748}" type="datetimeFigureOut">
               <a:rPr lang="en-US" smtClean="0"/>
-              <a:t>5/6/2016</a:t>
+              <a:t>5/16/16</a:t>
             </a:fld>
             <a:endParaRPr lang="en-US"/>
           </a:p>
@@ -2919,7 +2920,7 @@
           <a:p>
             <a:fld id="{D1C2D9A5-2501-4A0C-90A8-57153B34B748}" type="datetimeFigureOut">
               <a:rPr lang="en-US" smtClean="0"/>
-              <a:t>5/6/2016</a:t>
+              <a:t>5/16/16</a:t>
             </a:fld>
             <a:endParaRPr lang="en-US"/>
           </a:p>
@@ -3390,7 +3391,7 @@
   <p:timing>
     <p:tnLst>
       <p:par>
-        <p:cTn id="1" dur="indefinite" restart="never" nodeType="tmRoot"/>
+        <p:cTn xmlns:p14="http://schemas.microsoft.com/office/powerpoint/2010/main" id="1" dur="indefinite" restart="never" nodeType="tmRoot"/>
       </p:par>
     </p:tnLst>
   </p:timing>
@@ -3462,11 +3463,7 @@
             </a:r>
             <a:r>
               <a:rPr lang="en-US" dirty="0" smtClean="0"/>
-              <a:t> </a:t>
-            </a:r>
-            <a:r>
-              <a:rPr lang="en-US" dirty="0" smtClean="0"/>
-              <a:t>4.3</a:t>
+              <a:t> 4.3</a:t>
             </a:r>
           </a:p>
           <a:p>
@@ -3502,7 +3499,7 @@
   <p:timing>
     <p:tnLst>
       <p:par>
-        <p:cTn id="1" dur="indefinite" restart="never" nodeType="tmRoot"/>
+        <p:cTn xmlns:p14="http://schemas.microsoft.com/office/powerpoint/2010/main" id="1" dur="indefinite" restart="never" nodeType="tmRoot"/>
       </p:par>
     </p:tnLst>
   </p:timing>
@@ -3619,6 +3616,142 @@
     <p:extLst>
       <p:ext uri="{BB962C8B-B14F-4D97-AF65-F5344CB8AC3E}">
         <p14:creationId xmlns:p14="http://schemas.microsoft.com/office/powerpoint/2010/main" val="2834837887"/>
+      </p:ext>
+    </p:extLst>
+  </p:cSld>
+  <p:clrMapOvr>
+    <a:masterClrMapping/>
+  </p:clrMapOvr>
+</p:sld>
+</file>
+
+<file path=ppt/slides/slide4.xml><?xml version="1.0" encoding="utf-8"?>
+<p:sld xmlns:a="http://schemas.openxmlformats.org/drawingml/2006/main" xmlns:r="http://schemas.openxmlformats.org/officeDocument/2006/relationships" xmlns:p="http://schemas.openxmlformats.org/presentationml/2006/main">
+  <p:cSld>
+    <p:spTree>
+      <p:nvGrpSpPr>
+        <p:cNvPr id="1" name=""/>
+        <p:cNvGrpSpPr/>
+        <p:nvPr/>
+      </p:nvGrpSpPr>
+      <p:grpSpPr>
+        <a:xfrm>
+          <a:off x="0" y="0"/>
+          <a:ext cx="0" cy="0"/>
+          <a:chOff x="0" y="0"/>
+          <a:chExt cx="0" cy="0"/>
+        </a:xfrm>
+      </p:grpSpPr>
+      <p:sp>
+        <p:nvSpPr>
+          <p:cNvPr id="5" name="Title 4"/>
+          <p:cNvSpPr>
+            <a:spLocks noGrp="1"/>
+          </p:cNvSpPr>
+          <p:nvPr>
+            <p:ph type="title"/>
+          </p:nvPr>
+        </p:nvSpPr>
+        <p:spPr/>
+        <p:txBody>
+          <a:bodyPr/>
+          <a:lstStyle/>
+          <a:p>
+            <a:r>
+              <a:rPr lang="en-US" dirty="0" smtClean="0"/>
+              <a:t>Login</a:t>
+            </a:r>
+            <a:endParaRPr lang="en-US" dirty="0"/>
+          </a:p>
+        </p:txBody>
+      </p:sp>
+      <p:sp>
+        <p:nvSpPr>
+          <p:cNvPr id="6" name="Content Placeholder 5"/>
+          <p:cNvSpPr>
+            <a:spLocks noGrp="1"/>
+          </p:cNvSpPr>
+          <p:nvPr>
+            <p:ph idx="1"/>
+          </p:nvPr>
+        </p:nvSpPr>
+        <p:spPr/>
+        <p:txBody>
+          <a:bodyPr/>
+          <a:lstStyle/>
+          <a:p>
+            <a:r>
+              <a:rPr lang="en-US" dirty="0" smtClean="0"/>
+              <a:t>User account info:</a:t>
+            </a:r>
+          </a:p>
+          <a:p>
+            <a:pPr lvl="1"/>
+            <a:r>
+              <a:rPr lang="en-US" dirty="0" smtClean="0"/>
+              <a:t>User train</a:t>
+            </a:r>
+          </a:p>
+          <a:p>
+            <a:pPr marL="457200" lvl="1" indent="0">
+              <a:buNone/>
+            </a:pPr>
+            <a:r>
+              <a:rPr lang="en-US" dirty="0" smtClean="0"/>
+              <a:t>Username: 	train</a:t>
+            </a:r>
+          </a:p>
+          <a:p>
+            <a:pPr marL="457200" lvl="1" indent="0">
+              <a:buNone/>
+            </a:pPr>
+            <a:r>
+              <a:rPr lang="en-US" dirty="0" smtClean="0"/>
+              <a:t>Password: 		train</a:t>
+            </a:r>
+          </a:p>
+          <a:p>
+            <a:pPr marL="457200" lvl="1" indent="0">
+              <a:buNone/>
+            </a:pPr>
+            <a:endParaRPr lang="en-US" dirty="0"/>
+          </a:p>
+          <a:p>
+            <a:pPr lvl="1"/>
+            <a:r>
+              <a:rPr lang="en-US" dirty="0" smtClean="0"/>
+              <a:t>User root</a:t>
+            </a:r>
+          </a:p>
+          <a:p>
+            <a:pPr marL="457200" lvl="1" indent="0">
+              <a:buNone/>
+            </a:pPr>
+            <a:r>
+              <a:rPr lang="en-US" dirty="0" smtClean="0"/>
+              <a:t>Username:		root</a:t>
+            </a:r>
+          </a:p>
+          <a:p>
+            <a:pPr marL="457200" lvl="1" indent="0">
+              <a:buNone/>
+            </a:pPr>
+            <a:r>
+              <a:rPr lang="en-US" dirty="0" smtClean="0"/>
+              <a:t>Password:	</a:t>
+            </a:r>
+            <a:r>
+              <a:rPr lang="en-US" smtClean="0"/>
+              <a:t>	train</a:t>
+            </a:r>
+            <a:endParaRPr lang="en-US" dirty="0"/>
+          </a:p>
+        </p:txBody>
+      </p:sp>
+    </p:spTree>
+    <p:extLst>
+      <p:ext uri="{BB962C8B-B14F-4D97-AF65-F5344CB8AC3E}">
+        <p14:creationId xmlns:p14="http://schemas.microsoft.com/office/powerpoint/2010/main" val="2584435793"/>
       </p:ext>
     </p:extLst>
   </p:cSld>
@@ -3671,7 +3804,7 @@
     </a:clrScheme>
     <a:fontScheme name="Office">
       <a:majorFont>
-        <a:latin typeface="Calibri Light" panose="020F0302020204030204"/>
+        <a:latin typeface="Calibri Light"/>
         <a:ea typeface=""/>
         <a:cs typeface=""/>
         <a:font script="Jpan" typeface="ＭＳ Ｐゴシック"/>
@@ -3706,7 +3839,7 @@
         <a:font script="Geor" typeface="Sylfaen"/>
       </a:majorFont>
       <a:minorFont>
-        <a:latin typeface="Calibri" panose="020F0502020204030204"/>
+        <a:latin typeface="Calibri"/>
         <a:ea typeface=""/>
         <a:cs typeface=""/>
         <a:font script="Jpan" typeface="ＭＳ Ｐゴシック"/>
@@ -3883,7 +4016,7 @@
   <a:extraClrSchemeLst/>
   <a:extLst>
     <a:ext uri="{05A4C25C-085E-4340-85A3-A5531E510DB2}">
-      <thm15:themeFamily xmlns:thm15="http://schemas.microsoft.com/office/thememl/2012/main" name="Office Theme" id="{62F939B6-93AF-4DB8-9C6B-D6C7DFDC589F}" vid="{4A3C46E8-61CC-4603-A589-7422A47A8E4A}"/>
+      <thm15:themeFamily xmlns:thm15="http://schemas.microsoft.com/office/thememl/2012/main" xmlns="" name="Office Theme" id="{62F939B6-93AF-4DB8-9C6B-D6C7DFDC589F}" vid="{4A3C46E8-61CC-4603-A589-7422A47A8E4A}"/>
     </a:ext>
   </a:extLst>
 </a:theme>
@@ -3932,7 +4065,7 @@
     </a:clrScheme>
     <a:fontScheme name="Office">
       <a:majorFont>
-        <a:latin typeface="Calibri Light" panose="020F0302020204030204"/>
+        <a:latin typeface="Calibri Light"/>
         <a:ea typeface=""/>
         <a:cs typeface=""/>
         <a:font script="Jpan" typeface="ＭＳ Ｐゴシック"/>
@@ -3967,7 +4100,7 @@
         <a:font script="Geor" typeface="Sylfaen"/>
       </a:majorFont>
       <a:minorFont>
-        <a:latin typeface="Calibri" panose="020F0502020204030204"/>
+        <a:latin typeface="Calibri"/>
         <a:ea typeface=""/>
         <a:cs typeface=""/>
         <a:font script="Jpan" typeface="ＭＳ Ｐゴシック"/>
@@ -4144,7 +4277,7 @@
   <a:extraClrSchemeLst/>
   <a:extLst>
     <a:ext uri="{05A4C25C-085E-4340-85A3-A5531E510DB2}">
-      <thm15:themeFamily xmlns:thm15="http://schemas.microsoft.com/office/thememl/2012/main" name="Office Theme" id="{62F939B6-93AF-4DB8-9C6B-D6C7DFDC589F}" vid="{4A3C46E8-61CC-4603-A589-7422A47A8E4A}"/>
+      <thm15:themeFamily xmlns:thm15="http://schemas.microsoft.com/office/thememl/2012/main" xmlns="" name="Office Theme" id="{62F939B6-93AF-4DB8-9C6B-D6C7DFDC589F}" vid="{4A3C46E8-61CC-4603-A589-7422A47A8E4A}"/>
     </a:ext>
   </a:extLst>
 </a:theme>

</xml_diff>